<commit_message>
Add business analysis and fix solution
</commit_message>
<xml_diff>
--- a/01_Documents/Solutions_20180228.pptx
+++ b/01_Documents/Solutions_20180228.pptx
@@ -7,6 +7,9 @@
   <p:sldIdLst>
     <p:sldId id="256" r:id="rId2"/>
     <p:sldId id="257" r:id="rId3"/>
+    <p:sldId id="258" r:id="rId4"/>
+    <p:sldId id="259" r:id="rId5"/>
+    <p:sldId id="260" r:id="rId6"/>
   </p:sldIdLst>
   <p:sldSz cx="9144000" cy="6858000" type="screen4x3"/>
   <p:notesSz cx="6858000" cy="9144000"/>
@@ -733,7 +736,7 @@
           <a:p>
             <a:fld id="{A960B3C7-B0B6-45E7-9044-D11866841276}" type="datetimeFigureOut">
               <a:rPr lang="en-GB" smtClean="0"/>
-              <a:t>28/02/2018</a:t>
+              <a:t>07/03/2018</a:t>
             </a:fld>
             <a:endParaRPr lang="en-GB"/>
           </a:p>
@@ -929,7 +932,7 @@
           <a:p>
             <a:fld id="{A960B3C7-B0B6-45E7-9044-D11866841276}" type="datetimeFigureOut">
               <a:rPr lang="en-GB" smtClean="0"/>
-              <a:t>28/02/2018</a:t>
+              <a:t>07/03/2018</a:t>
             </a:fld>
             <a:endParaRPr lang="en-GB"/>
           </a:p>
@@ -1114,7 +1117,7 @@
           <a:p>
             <a:fld id="{A960B3C7-B0B6-45E7-9044-D11866841276}" type="datetimeFigureOut">
               <a:rPr lang="en-GB" smtClean="0"/>
-              <a:t>28/02/2018</a:t>
+              <a:t>07/03/2018</a:t>
             </a:fld>
             <a:endParaRPr lang="en-GB"/>
           </a:p>
@@ -1264,7 +1267,7 @@
           <a:p>
             <a:fld id="{A960B3C7-B0B6-45E7-9044-D11866841276}" type="datetimeFigureOut">
               <a:rPr lang="en-GB" smtClean="0"/>
-              <a:t>28/02/2018</a:t>
+              <a:t>07/03/2018</a:t>
             </a:fld>
             <a:endParaRPr lang="en-GB"/>
           </a:p>
@@ -1519,7 +1522,7 @@
           <a:p>
             <a:fld id="{A960B3C7-B0B6-45E7-9044-D11866841276}" type="datetimeFigureOut">
               <a:rPr lang="en-GB" smtClean="0"/>
-              <a:t>28/02/2018</a:t>
+              <a:t>07/03/2018</a:t>
             </a:fld>
             <a:endParaRPr lang="en-GB"/>
           </a:p>
@@ -1928,7 +1931,7 @@
           <a:p>
             <a:fld id="{A960B3C7-B0B6-45E7-9044-D11866841276}" type="datetimeFigureOut">
               <a:rPr lang="en-GB" smtClean="0"/>
-              <a:t>28/02/2018</a:t>
+              <a:t>07/03/2018</a:t>
             </a:fld>
             <a:endParaRPr lang="en-GB"/>
           </a:p>
@@ -2374,7 +2377,7 @@
           <a:p>
             <a:fld id="{A960B3C7-B0B6-45E7-9044-D11866841276}" type="datetimeFigureOut">
               <a:rPr lang="en-GB" smtClean="0"/>
-              <a:t>28/02/2018</a:t>
+              <a:t>07/03/2018</a:t>
             </a:fld>
             <a:endParaRPr lang="en-GB"/>
           </a:p>
@@ -2475,7 +2478,7 @@
           <a:p>
             <a:fld id="{A960B3C7-B0B6-45E7-9044-D11866841276}" type="datetimeFigureOut">
               <a:rPr lang="en-GB" smtClean="0"/>
-              <a:t>28/02/2018</a:t>
+              <a:t>07/03/2018</a:t>
             </a:fld>
             <a:endParaRPr lang="en-GB"/>
           </a:p>
@@ -2596,7 +2599,7 @@
           <a:p>
             <a:fld id="{A960B3C7-B0B6-45E7-9044-D11866841276}" type="datetimeFigureOut">
               <a:rPr lang="en-GB" smtClean="0"/>
-              <a:t>28/02/2018</a:t>
+              <a:t>07/03/2018</a:t>
             </a:fld>
             <a:endParaRPr lang="en-GB"/>
           </a:p>
@@ -2870,7 +2873,7 @@
           <a:p>
             <a:fld id="{A960B3C7-B0B6-45E7-9044-D11866841276}" type="datetimeFigureOut">
               <a:rPr lang="en-GB" smtClean="0"/>
-              <a:t>28/02/2018</a:t>
+              <a:t>07/03/2018</a:t>
             </a:fld>
             <a:endParaRPr lang="en-GB"/>
           </a:p>
@@ -3075,7 +3078,7 @@
           <a:p>
             <a:fld id="{A960B3C7-B0B6-45E7-9044-D11866841276}" type="datetimeFigureOut">
               <a:rPr lang="en-GB" smtClean="0"/>
-              <a:t>28/02/2018</a:t>
+              <a:t>07/03/2018</a:t>
             </a:fld>
             <a:endParaRPr lang="en-GB"/>
           </a:p>
@@ -4184,7 +4187,7 @@
           <a:p>
             <a:fld id="{A960B3C7-B0B6-45E7-9044-D11866841276}" type="datetimeFigureOut">
               <a:rPr lang="en-GB" smtClean="0"/>
-              <a:t>28/02/2018</a:t>
+              <a:t>07/03/2018</a:t>
             </a:fld>
             <a:endParaRPr lang="en-GB"/>
           </a:p>
@@ -4740,6 +4743,61 @@
               </a:rPr>
               <a:t>sản</a:t>
             </a:r>
+            <a:endParaRPr lang="en-US" dirty="0" smtClean="0">
+              <a:latin typeface="Times New Roman" pitchFamily="18" charset="0"/>
+              <a:cs typeface="Times New Roman" pitchFamily="18" charset="0"/>
+            </a:endParaRPr>
+          </a:p>
+          <a:p>
+            <a:r>
+              <a:rPr lang="en-US" dirty="0" err="1" smtClean="0">
+                <a:latin typeface="Times New Roman" pitchFamily="18" charset="0"/>
+                <a:cs typeface="Times New Roman" pitchFamily="18" charset="0"/>
+              </a:rPr>
+              <a:t>Giải</a:t>
+            </a:r>
+            <a:r>
+              <a:rPr lang="en-US" dirty="0" smtClean="0">
+                <a:latin typeface="Times New Roman" pitchFamily="18" charset="0"/>
+                <a:cs typeface="Times New Roman" pitchFamily="18" charset="0"/>
+              </a:rPr>
+              <a:t> </a:t>
+            </a:r>
+            <a:r>
+              <a:rPr lang="en-US" dirty="0" err="1" smtClean="0">
+                <a:latin typeface="Times New Roman" pitchFamily="18" charset="0"/>
+                <a:cs typeface="Times New Roman" pitchFamily="18" charset="0"/>
+              </a:rPr>
+              <a:t>pháp</a:t>
+            </a:r>
+            <a:r>
+              <a:rPr lang="en-US" dirty="0" smtClean="0">
+                <a:latin typeface="Times New Roman" pitchFamily="18" charset="0"/>
+                <a:cs typeface="Times New Roman" pitchFamily="18" charset="0"/>
+              </a:rPr>
+              <a:t> </a:t>
+            </a:r>
+            <a:r>
+              <a:rPr lang="en-US" dirty="0" err="1" smtClean="0">
+                <a:latin typeface="Times New Roman" pitchFamily="18" charset="0"/>
+                <a:cs typeface="Times New Roman" pitchFamily="18" charset="0"/>
+              </a:rPr>
+              <a:t>đề</a:t>
+            </a:r>
+            <a:r>
+              <a:rPr lang="en-US" dirty="0" smtClean="0">
+                <a:latin typeface="Times New Roman" pitchFamily="18" charset="0"/>
+                <a:cs typeface="Times New Roman" pitchFamily="18" charset="0"/>
+              </a:rPr>
+              <a:t> </a:t>
+            </a:r>
+            <a:r>
+              <a:rPr lang="en-US" dirty="0" err="1" smtClean="0">
+                <a:latin typeface="Times New Roman" pitchFamily="18" charset="0"/>
+                <a:cs typeface="Times New Roman" pitchFamily="18" charset="0"/>
+              </a:rPr>
+              <a:t>xuất</a:t>
+            </a:r>
             <a:endParaRPr lang="en-GB" dirty="0">
               <a:latin typeface="Times New Roman" pitchFamily="18" charset="0"/>
               <a:cs typeface="Times New Roman" pitchFamily="18" charset="0"/>
@@ -5343,6 +5401,2112 @@
     <p:extLst>
       <p:ext uri="{BB962C8B-B14F-4D97-AF65-F5344CB8AC3E}">
         <p14:creationId xmlns:p14="http://schemas.microsoft.com/office/powerpoint/2010/main" val="3395033628"/>
+      </p:ext>
+    </p:extLst>
+  </p:cSld>
+  <p:clrMapOvr>
+    <a:masterClrMapping/>
+  </p:clrMapOvr>
+  <p:timing>
+    <p:tnLst>
+      <p:par>
+        <p:cTn id="1" dur="indefinite" restart="never" nodeType="tmRoot"/>
+      </p:par>
+    </p:tnLst>
+  </p:timing>
+</p:sld>
+</file>
+
+<file path=ppt/slides/slide3.xml><?xml version="1.0" encoding="utf-8"?>
+<p:sld xmlns:a="http://schemas.openxmlformats.org/drawingml/2006/main" xmlns:r="http://schemas.openxmlformats.org/officeDocument/2006/relationships" xmlns:p="http://schemas.openxmlformats.org/presentationml/2006/main">
+  <p:cSld>
+    <p:spTree>
+      <p:nvGrpSpPr>
+        <p:cNvPr id="1" name=""/>
+        <p:cNvGrpSpPr/>
+        <p:nvPr/>
+      </p:nvGrpSpPr>
+      <p:grpSpPr>
+        <a:xfrm>
+          <a:off x="0" y="0"/>
+          <a:ext cx="0" cy="0"/>
+          <a:chOff x="0" y="0"/>
+          <a:chExt cx="0" cy="0"/>
+        </a:xfrm>
+      </p:grpSpPr>
+      <p:sp>
+        <p:nvSpPr>
+          <p:cNvPr id="3" name="Content Placeholder 2"/>
+          <p:cNvSpPr>
+            <a:spLocks noGrp="1"/>
+          </p:cNvSpPr>
+          <p:nvPr>
+            <p:ph idx="1"/>
+          </p:nvPr>
+        </p:nvSpPr>
+        <p:spPr/>
+        <p:txBody>
+          <a:bodyPr/>
+          <a:lstStyle/>
+          <a:p>
+            <a:pPr marL="109728" indent="0">
+              <a:buNone/>
+            </a:pPr>
+            <a:r>
+              <a:rPr lang="en-US" dirty="0" err="1" smtClean="0"/>
+              <a:t>Ưu</a:t>
+            </a:r>
+            <a:r>
+              <a:rPr lang="en-US" dirty="0" smtClean="0"/>
+              <a:t> </a:t>
+            </a:r>
+            <a:r>
+              <a:rPr lang="en-US" dirty="0" err="1" smtClean="0"/>
+              <a:t>điểm</a:t>
+            </a:r>
+            <a:r>
+              <a:rPr lang="en-US" dirty="0" smtClean="0"/>
+              <a:t>:</a:t>
+            </a:r>
+          </a:p>
+          <a:p>
+            <a:pPr marL="624078" indent="-514350">
+              <a:buFont typeface="+mj-lt"/>
+              <a:buAutoNum type="arabicPeriod"/>
+            </a:pPr>
+            <a:r>
+              <a:rPr lang="en-US" dirty="0" err="1" smtClean="0"/>
+              <a:t>Lưu</a:t>
+            </a:r>
+            <a:r>
+              <a:rPr lang="en-US" dirty="0" smtClean="0"/>
+              <a:t> </a:t>
+            </a:r>
+            <a:r>
+              <a:rPr lang="en-US" dirty="0" err="1" smtClean="0"/>
+              <a:t>trữ</a:t>
+            </a:r>
+            <a:r>
+              <a:rPr lang="en-US" dirty="0" smtClean="0"/>
+              <a:t> </a:t>
+            </a:r>
+            <a:r>
+              <a:rPr lang="en-US" dirty="0" err="1" smtClean="0"/>
+              <a:t>tạm</a:t>
+            </a:r>
+            <a:r>
+              <a:rPr lang="en-US" dirty="0" smtClean="0"/>
+              <a:t> data (JSON) </a:t>
+            </a:r>
+            <a:r>
+              <a:rPr lang="en-US" dirty="0" err="1" smtClean="0"/>
+              <a:t>trên</a:t>
+            </a:r>
+            <a:r>
+              <a:rPr lang="en-US" dirty="0" smtClean="0"/>
+              <a:t> local </a:t>
+            </a:r>
+            <a:r>
+              <a:rPr lang="en-US" dirty="0" err="1" smtClean="0"/>
+              <a:t>giúp</a:t>
+            </a:r>
+            <a:r>
+              <a:rPr lang="en-US" dirty="0" smtClean="0"/>
+              <a:t> </a:t>
+            </a:r>
+            <a:r>
+              <a:rPr lang="en-US" dirty="0" err="1" smtClean="0"/>
+              <a:t>phần</a:t>
+            </a:r>
+            <a:r>
+              <a:rPr lang="en-US" dirty="0" smtClean="0"/>
+              <a:t> </a:t>
+            </a:r>
+            <a:r>
+              <a:rPr lang="en-US" dirty="0" err="1" smtClean="0"/>
+              <a:t>mềm</a:t>
+            </a:r>
+            <a:r>
+              <a:rPr lang="en-US" dirty="0" smtClean="0"/>
+              <a:t> </a:t>
+            </a:r>
+            <a:r>
+              <a:rPr lang="en-US" dirty="0" err="1" smtClean="0"/>
+              <a:t>hoạt</a:t>
+            </a:r>
+            <a:r>
+              <a:rPr lang="en-US" dirty="0" smtClean="0"/>
+              <a:t> </a:t>
+            </a:r>
+            <a:r>
+              <a:rPr lang="en-US" dirty="0" err="1" smtClean="0"/>
+              <a:t>động</a:t>
+            </a:r>
+            <a:r>
+              <a:rPr lang="en-US" dirty="0" smtClean="0"/>
+              <a:t> </a:t>
+            </a:r>
+            <a:r>
+              <a:rPr lang="en-US" dirty="0" err="1" smtClean="0"/>
+              <a:t>được</a:t>
+            </a:r>
+            <a:r>
+              <a:rPr lang="en-US" dirty="0" smtClean="0"/>
+              <a:t> </a:t>
+            </a:r>
+            <a:r>
+              <a:rPr lang="en-US" dirty="0" err="1" smtClean="0"/>
+              <a:t>ngay</a:t>
+            </a:r>
+            <a:r>
+              <a:rPr lang="en-US" dirty="0" smtClean="0"/>
+              <a:t> </a:t>
+            </a:r>
+            <a:r>
+              <a:rPr lang="en-US" dirty="0" err="1" smtClean="0"/>
+              <a:t>cả</a:t>
+            </a:r>
+            <a:r>
+              <a:rPr lang="en-US" dirty="0" smtClean="0"/>
+              <a:t> </a:t>
+            </a:r>
+            <a:r>
+              <a:rPr lang="en-US" dirty="0" err="1" smtClean="0"/>
+              <a:t>khi</a:t>
+            </a:r>
+            <a:r>
+              <a:rPr lang="en-US" dirty="0" smtClean="0"/>
+              <a:t> </a:t>
+            </a:r>
+            <a:r>
+              <a:rPr lang="en-US" dirty="0" err="1" smtClean="0"/>
+              <a:t>có</a:t>
+            </a:r>
+            <a:r>
+              <a:rPr lang="en-US" dirty="0" smtClean="0"/>
+              <a:t> </a:t>
+            </a:r>
+            <a:r>
+              <a:rPr lang="en-US" dirty="0" err="1" smtClean="0"/>
+              <a:t>sự</a:t>
+            </a:r>
+            <a:r>
+              <a:rPr lang="en-US" dirty="0" smtClean="0"/>
+              <a:t> </a:t>
+            </a:r>
+            <a:r>
+              <a:rPr lang="en-US" dirty="0" err="1" smtClean="0"/>
+              <a:t>cố</a:t>
+            </a:r>
+            <a:r>
+              <a:rPr lang="en-US" dirty="0" smtClean="0"/>
+              <a:t> </a:t>
+            </a:r>
+            <a:r>
+              <a:rPr lang="en-US" dirty="0" err="1" smtClean="0"/>
+              <a:t>về</a:t>
+            </a:r>
+            <a:r>
+              <a:rPr lang="en-US" dirty="0" smtClean="0"/>
+              <a:t> </a:t>
+            </a:r>
+            <a:r>
+              <a:rPr lang="en-US" dirty="0" err="1" smtClean="0"/>
+              <a:t>mạng</a:t>
+            </a:r>
+            <a:endParaRPr lang="en-US" dirty="0" smtClean="0"/>
+          </a:p>
+          <a:p>
+            <a:pPr marL="624078" indent="-514350">
+              <a:buFont typeface="+mj-lt"/>
+              <a:buAutoNum type="arabicPeriod"/>
+            </a:pPr>
+            <a:r>
+              <a:rPr lang="en-US" dirty="0" err="1" smtClean="0"/>
+              <a:t>Giúp</a:t>
+            </a:r>
+            <a:r>
+              <a:rPr lang="en-US" dirty="0" smtClean="0"/>
+              <a:t> </a:t>
+            </a:r>
+            <a:r>
+              <a:rPr lang="en-US" dirty="0" err="1" smtClean="0"/>
+              <a:t>đồng</a:t>
+            </a:r>
+            <a:r>
+              <a:rPr lang="en-US" dirty="0" smtClean="0"/>
+              <a:t> </a:t>
+            </a:r>
+            <a:r>
+              <a:rPr lang="en-US" dirty="0" err="1" smtClean="0"/>
+              <a:t>bộ</a:t>
+            </a:r>
+            <a:r>
+              <a:rPr lang="en-US" dirty="0" smtClean="0"/>
+              <a:t> </a:t>
+            </a:r>
+            <a:r>
+              <a:rPr lang="en-US" dirty="0" err="1" smtClean="0"/>
+              <a:t>phương</a:t>
+            </a:r>
+            <a:r>
+              <a:rPr lang="en-US" dirty="0" smtClean="0"/>
+              <a:t> </a:t>
+            </a:r>
+            <a:r>
+              <a:rPr lang="en-US" dirty="0" err="1" smtClean="0"/>
+              <a:t>thức</a:t>
+            </a:r>
+            <a:r>
+              <a:rPr lang="en-US" dirty="0" smtClean="0"/>
+              <a:t> </a:t>
+            </a:r>
+            <a:r>
+              <a:rPr lang="en-US" dirty="0" err="1" smtClean="0"/>
+              <a:t>trao</a:t>
+            </a:r>
+            <a:r>
+              <a:rPr lang="en-US" dirty="0" smtClean="0"/>
+              <a:t> </a:t>
+            </a:r>
+            <a:r>
+              <a:rPr lang="en-US" dirty="0" err="1" smtClean="0"/>
+              <a:t>đổi</a:t>
+            </a:r>
+            <a:r>
+              <a:rPr lang="en-US" dirty="0" smtClean="0"/>
+              <a:t> </a:t>
+            </a:r>
+            <a:r>
+              <a:rPr lang="en-US" dirty="0" err="1" smtClean="0"/>
+              <a:t>giữa</a:t>
+            </a:r>
+            <a:r>
+              <a:rPr lang="en-US" dirty="0"/>
+              <a:t> </a:t>
+            </a:r>
+            <a:r>
+              <a:rPr lang="en-US" dirty="0" err="1" smtClean="0"/>
+              <a:t>phần</a:t>
+            </a:r>
+            <a:r>
+              <a:rPr lang="en-US" dirty="0" smtClean="0"/>
+              <a:t> </a:t>
+            </a:r>
+            <a:r>
+              <a:rPr lang="en-US" dirty="0" err="1" smtClean="0"/>
+              <a:t>mềm</a:t>
+            </a:r>
+            <a:r>
+              <a:rPr lang="en-US" dirty="0" smtClean="0"/>
+              <a:t> di </a:t>
+            </a:r>
+            <a:r>
+              <a:rPr lang="en-US" dirty="0" err="1" smtClean="0"/>
+              <a:t>động</a:t>
+            </a:r>
+            <a:r>
+              <a:rPr lang="en-US" dirty="0" smtClean="0"/>
+              <a:t> </a:t>
+            </a:r>
+            <a:r>
+              <a:rPr lang="en-US" dirty="0" err="1" smtClean="0"/>
+              <a:t>và</a:t>
+            </a:r>
+            <a:r>
+              <a:rPr lang="en-US" dirty="0" smtClean="0"/>
+              <a:t> </a:t>
+            </a:r>
+            <a:r>
+              <a:rPr lang="en-US" dirty="0" err="1" smtClean="0"/>
+              <a:t>trang</a:t>
+            </a:r>
+            <a:r>
+              <a:rPr lang="en-US" dirty="0" smtClean="0"/>
+              <a:t> web </a:t>
+            </a:r>
+            <a:r>
+              <a:rPr lang="en-US" dirty="0" err="1" smtClean="0"/>
+              <a:t>với</a:t>
+            </a:r>
+            <a:r>
+              <a:rPr lang="en-US" dirty="0" smtClean="0"/>
+              <a:t> </a:t>
+            </a:r>
+            <a:r>
+              <a:rPr lang="en-US" dirty="0" err="1" smtClean="0"/>
+              <a:t>máy</a:t>
+            </a:r>
+            <a:r>
+              <a:rPr lang="en-US" dirty="0" smtClean="0"/>
+              <a:t> server</a:t>
+            </a:r>
+          </a:p>
+          <a:p>
+            <a:pPr marL="624078" indent="-514350">
+              <a:buFont typeface="+mj-lt"/>
+              <a:buAutoNum type="arabicPeriod"/>
+            </a:pPr>
+            <a:r>
+              <a:rPr lang="en-US" dirty="0" err="1" smtClean="0"/>
+              <a:t>Thời</a:t>
+            </a:r>
+            <a:r>
+              <a:rPr lang="en-US" dirty="0" smtClean="0"/>
+              <a:t> </a:t>
+            </a:r>
+            <a:r>
+              <a:rPr lang="en-US" dirty="0" err="1" smtClean="0"/>
+              <a:t>gian</a:t>
+            </a:r>
+            <a:r>
+              <a:rPr lang="en-US" dirty="0" smtClean="0"/>
+              <a:t>/Dung </a:t>
+            </a:r>
+            <a:r>
+              <a:rPr lang="en-US" dirty="0" err="1" smtClean="0"/>
+              <a:t>lượng</a:t>
+            </a:r>
+            <a:r>
+              <a:rPr lang="en-US" dirty="0"/>
+              <a:t> </a:t>
+            </a:r>
+            <a:r>
+              <a:rPr lang="en-US" dirty="0" err="1" smtClean="0"/>
+              <a:t>tải</a:t>
+            </a:r>
+            <a:r>
+              <a:rPr lang="en-US" dirty="0" smtClean="0"/>
+              <a:t> </a:t>
+            </a:r>
+            <a:r>
+              <a:rPr lang="en-US" dirty="0" err="1" smtClean="0"/>
+              <a:t>nội</a:t>
+            </a:r>
+            <a:r>
+              <a:rPr lang="en-US" dirty="0" smtClean="0"/>
+              <a:t> dung </a:t>
+            </a:r>
+            <a:r>
+              <a:rPr lang="en-US" dirty="0" err="1" smtClean="0"/>
+              <a:t>cập</a:t>
+            </a:r>
+            <a:r>
+              <a:rPr lang="en-US" dirty="0" smtClean="0"/>
+              <a:t> </a:t>
+            </a:r>
+            <a:r>
+              <a:rPr lang="en-US" dirty="0" err="1" smtClean="0"/>
+              <a:t>nhật</a:t>
+            </a:r>
+            <a:r>
+              <a:rPr lang="en-US" dirty="0" smtClean="0"/>
+              <a:t> </a:t>
+            </a:r>
+            <a:r>
+              <a:rPr lang="en-US" dirty="0" err="1" smtClean="0"/>
+              <a:t>được</a:t>
+            </a:r>
+            <a:r>
+              <a:rPr lang="en-US" dirty="0" smtClean="0"/>
+              <a:t> </a:t>
+            </a:r>
+            <a:r>
+              <a:rPr lang="en-US" dirty="0" err="1" smtClean="0"/>
+              <a:t>giảm</a:t>
+            </a:r>
+            <a:r>
+              <a:rPr lang="en-US" dirty="0" smtClean="0"/>
+              <a:t> </a:t>
+            </a:r>
+            <a:r>
+              <a:rPr lang="en-US" dirty="0" err="1" smtClean="0"/>
+              <a:t>bớt</a:t>
+            </a:r>
+            <a:r>
+              <a:rPr lang="en-US" dirty="0" smtClean="0"/>
+              <a:t> so </a:t>
+            </a:r>
+            <a:r>
+              <a:rPr lang="en-US" dirty="0" err="1" smtClean="0"/>
+              <a:t>với</a:t>
+            </a:r>
+            <a:r>
+              <a:rPr lang="en-US" dirty="0" smtClean="0"/>
+              <a:t> </a:t>
+            </a:r>
+            <a:r>
+              <a:rPr lang="en-US" dirty="0" err="1" smtClean="0"/>
+              <a:t>việc</a:t>
+            </a:r>
+            <a:r>
+              <a:rPr lang="en-US" dirty="0" smtClean="0"/>
+              <a:t> </a:t>
+            </a:r>
+            <a:r>
+              <a:rPr lang="en-US" dirty="0" err="1" smtClean="0"/>
+              <a:t>tải</a:t>
+            </a:r>
+            <a:r>
+              <a:rPr lang="en-US" dirty="0" smtClean="0"/>
+              <a:t> </a:t>
+            </a:r>
+            <a:r>
+              <a:rPr lang="en-US" dirty="0" err="1" smtClean="0"/>
+              <a:t>lại</a:t>
+            </a:r>
+            <a:r>
+              <a:rPr lang="en-US" dirty="0" smtClean="0"/>
+              <a:t> </a:t>
+            </a:r>
+            <a:r>
+              <a:rPr lang="en-US" dirty="0" err="1" smtClean="0"/>
+              <a:t>toàn</a:t>
+            </a:r>
+            <a:r>
+              <a:rPr lang="en-US" dirty="0" smtClean="0"/>
+              <a:t> </a:t>
+            </a:r>
+            <a:r>
+              <a:rPr lang="en-US" dirty="0" err="1" smtClean="0"/>
+              <a:t>bộ</a:t>
+            </a:r>
+            <a:r>
+              <a:rPr lang="en-US" dirty="0" smtClean="0"/>
+              <a:t> </a:t>
+            </a:r>
+            <a:r>
+              <a:rPr lang="en-US" dirty="0" err="1" smtClean="0"/>
+              <a:t>nội</a:t>
+            </a:r>
+            <a:r>
+              <a:rPr lang="en-US" dirty="0" smtClean="0"/>
+              <a:t> dung website (</a:t>
+            </a:r>
+            <a:r>
+              <a:rPr lang="en-US" dirty="0" err="1" smtClean="0"/>
+              <a:t>Đối</a:t>
+            </a:r>
+            <a:r>
+              <a:rPr lang="en-US" dirty="0" smtClean="0"/>
+              <a:t> </a:t>
+            </a:r>
+            <a:r>
+              <a:rPr lang="en-US" dirty="0" err="1" smtClean="0"/>
+              <a:t>với</a:t>
+            </a:r>
+            <a:r>
+              <a:rPr lang="en-US" dirty="0" smtClean="0"/>
+              <a:t> website)</a:t>
+            </a:r>
+            <a:endParaRPr lang="en-GB" dirty="0"/>
+          </a:p>
+        </p:txBody>
+      </p:sp>
+      <p:sp>
+        <p:nvSpPr>
+          <p:cNvPr id="2" name="Title 1"/>
+          <p:cNvSpPr>
+            <a:spLocks noGrp="1"/>
+          </p:cNvSpPr>
+          <p:nvPr>
+            <p:ph type="title"/>
+          </p:nvPr>
+        </p:nvSpPr>
+        <p:spPr/>
+        <p:txBody>
+          <a:bodyPr/>
+          <a:lstStyle/>
+          <a:p>
+            <a:r>
+              <a:rPr lang="en-US" dirty="0" err="1" smtClean="0">
+                <a:latin typeface="Times New Roman" pitchFamily="18" charset="0"/>
+                <a:cs typeface="Times New Roman" pitchFamily="18" charset="0"/>
+              </a:rPr>
+              <a:t>Thiết</a:t>
+            </a:r>
+            <a:r>
+              <a:rPr lang="en-US" dirty="0" smtClean="0">
+                <a:latin typeface="Times New Roman" pitchFamily="18" charset="0"/>
+                <a:cs typeface="Times New Roman" pitchFamily="18" charset="0"/>
+              </a:rPr>
+              <a:t> </a:t>
+            </a:r>
+            <a:r>
+              <a:rPr lang="en-US" dirty="0" err="1" smtClean="0">
+                <a:latin typeface="Times New Roman" pitchFamily="18" charset="0"/>
+                <a:cs typeface="Times New Roman" pitchFamily="18" charset="0"/>
+              </a:rPr>
+              <a:t>kế</a:t>
+            </a:r>
+            <a:r>
+              <a:rPr lang="en-US" dirty="0" smtClean="0">
+                <a:latin typeface="Times New Roman" pitchFamily="18" charset="0"/>
+                <a:cs typeface="Times New Roman" pitchFamily="18" charset="0"/>
+              </a:rPr>
+              <a:t> </a:t>
+            </a:r>
+            <a:r>
+              <a:rPr lang="en-US" dirty="0" err="1" smtClean="0">
+                <a:latin typeface="Times New Roman" pitchFamily="18" charset="0"/>
+                <a:cs typeface="Times New Roman" pitchFamily="18" charset="0"/>
+              </a:rPr>
+              <a:t>hệ</a:t>
+            </a:r>
+            <a:r>
+              <a:rPr lang="en-US" dirty="0" smtClean="0">
+                <a:latin typeface="Times New Roman" pitchFamily="18" charset="0"/>
+                <a:cs typeface="Times New Roman" pitchFamily="18" charset="0"/>
+              </a:rPr>
+              <a:t> </a:t>
+            </a:r>
+            <a:r>
+              <a:rPr lang="en-US" dirty="0" err="1" smtClean="0">
+                <a:latin typeface="Times New Roman" pitchFamily="18" charset="0"/>
+                <a:cs typeface="Times New Roman" pitchFamily="18" charset="0"/>
+              </a:rPr>
+              <a:t>thống</a:t>
+            </a:r>
+            <a:endParaRPr lang="en-GB" dirty="0">
+              <a:latin typeface="Times New Roman" pitchFamily="18" charset="0"/>
+              <a:cs typeface="Times New Roman" pitchFamily="18" charset="0"/>
+            </a:endParaRPr>
+          </a:p>
+        </p:txBody>
+      </p:sp>
+    </p:spTree>
+    <p:extLst>
+      <p:ext uri="{BB962C8B-B14F-4D97-AF65-F5344CB8AC3E}">
+        <p14:creationId xmlns:p14="http://schemas.microsoft.com/office/powerpoint/2010/main" val="823918763"/>
+      </p:ext>
+    </p:extLst>
+  </p:cSld>
+  <p:clrMapOvr>
+    <a:masterClrMapping/>
+  </p:clrMapOvr>
+  <p:timing>
+    <p:tnLst>
+      <p:par>
+        <p:cTn id="1" dur="indefinite" restart="never" nodeType="tmRoot"/>
+      </p:par>
+    </p:tnLst>
+  </p:timing>
+</p:sld>
+</file>
+
+<file path=ppt/slides/slide4.xml><?xml version="1.0" encoding="utf-8"?>
+<p:sld xmlns:a="http://schemas.openxmlformats.org/drawingml/2006/main" xmlns:r="http://schemas.openxmlformats.org/officeDocument/2006/relationships" xmlns:p="http://schemas.openxmlformats.org/presentationml/2006/main">
+  <p:cSld>
+    <p:spTree>
+      <p:nvGrpSpPr>
+        <p:cNvPr id="1" name=""/>
+        <p:cNvGrpSpPr/>
+        <p:nvPr/>
+      </p:nvGrpSpPr>
+      <p:grpSpPr>
+        <a:xfrm>
+          <a:off x="0" y="0"/>
+          <a:ext cx="0" cy="0"/>
+          <a:chOff x="0" y="0"/>
+          <a:chExt cx="0" cy="0"/>
+        </a:xfrm>
+      </p:grpSpPr>
+      <p:sp>
+        <p:nvSpPr>
+          <p:cNvPr id="3" name="Content Placeholder 2"/>
+          <p:cNvSpPr>
+            <a:spLocks noGrp="1"/>
+          </p:cNvSpPr>
+          <p:nvPr>
+            <p:ph idx="1"/>
+          </p:nvPr>
+        </p:nvSpPr>
+        <p:spPr/>
+        <p:txBody>
+          <a:bodyPr/>
+          <a:lstStyle/>
+          <a:p>
+            <a:pPr marL="109728" indent="0">
+              <a:buNone/>
+            </a:pPr>
+            <a:r>
+              <a:rPr lang="en-US" dirty="0" err="1" smtClean="0"/>
+              <a:t>Nhược</a:t>
+            </a:r>
+            <a:r>
+              <a:rPr lang="en-US" dirty="0" smtClean="0"/>
+              <a:t> </a:t>
+            </a:r>
+            <a:r>
+              <a:rPr lang="en-US" dirty="0" err="1" smtClean="0"/>
+              <a:t>điểm</a:t>
+            </a:r>
+            <a:r>
+              <a:rPr lang="en-US" dirty="0" smtClean="0"/>
+              <a:t>:</a:t>
+            </a:r>
+          </a:p>
+          <a:p>
+            <a:pPr marL="624078" indent="-514350">
+              <a:buFont typeface="+mj-lt"/>
+              <a:buAutoNum type="arabicPeriod"/>
+            </a:pPr>
+            <a:r>
+              <a:rPr lang="en-US" dirty="0" err="1" smtClean="0"/>
+              <a:t>Giải</a:t>
+            </a:r>
+            <a:r>
+              <a:rPr lang="en-US" dirty="0" smtClean="0"/>
+              <a:t> </a:t>
+            </a:r>
+            <a:r>
+              <a:rPr lang="en-US" dirty="0" err="1" smtClean="0"/>
+              <a:t>pháp</a:t>
+            </a:r>
+            <a:r>
+              <a:rPr lang="en-US" dirty="0" smtClean="0"/>
+              <a:t> </a:t>
+            </a:r>
+            <a:r>
+              <a:rPr lang="en-US" dirty="0" err="1" smtClean="0"/>
+              <a:t>có</a:t>
+            </a:r>
+            <a:r>
+              <a:rPr lang="en-US" dirty="0" smtClean="0"/>
+              <a:t> </a:t>
+            </a:r>
+            <a:r>
+              <a:rPr lang="en-US" dirty="0" err="1" smtClean="0"/>
+              <a:t>thể</a:t>
+            </a:r>
+            <a:r>
+              <a:rPr lang="en-US" dirty="0" smtClean="0"/>
+              <a:t> </a:t>
+            </a:r>
+            <a:r>
+              <a:rPr lang="en-US" dirty="0" err="1" smtClean="0"/>
+              <a:t>khiến</a:t>
+            </a:r>
+            <a:r>
+              <a:rPr lang="en-US" dirty="0" smtClean="0"/>
+              <a:t> </a:t>
+            </a:r>
+            <a:r>
+              <a:rPr lang="en-US" dirty="0" err="1" smtClean="0"/>
+              <a:t>thiết</a:t>
+            </a:r>
+            <a:r>
+              <a:rPr lang="en-US" dirty="0" smtClean="0"/>
+              <a:t> </a:t>
+            </a:r>
+            <a:r>
+              <a:rPr lang="en-US" dirty="0" err="1" smtClean="0"/>
+              <a:t>bị</a:t>
+            </a:r>
+            <a:r>
+              <a:rPr lang="en-US" dirty="0" smtClean="0"/>
+              <a:t> </a:t>
+            </a:r>
+            <a:r>
+              <a:rPr lang="en-US" dirty="0" err="1" smtClean="0"/>
+              <a:t>quá</a:t>
+            </a:r>
+            <a:r>
+              <a:rPr lang="en-US" dirty="0" smtClean="0"/>
+              <a:t> </a:t>
+            </a:r>
+            <a:r>
+              <a:rPr lang="en-US" dirty="0" err="1" smtClean="0"/>
+              <a:t>tải</a:t>
+            </a:r>
+            <a:r>
+              <a:rPr lang="en-US" dirty="0" smtClean="0"/>
+              <a:t> </a:t>
+            </a:r>
+            <a:r>
+              <a:rPr lang="en-US" dirty="0" err="1" smtClean="0"/>
+              <a:t>kh</a:t>
+            </a:r>
+            <a:r>
+              <a:rPr lang="en-US" dirty="0" err="1" smtClean="0"/>
+              <a:t>i</a:t>
+            </a:r>
+            <a:r>
+              <a:rPr lang="en-US" dirty="0" smtClean="0"/>
+              <a:t> </a:t>
+            </a:r>
+            <a:r>
+              <a:rPr lang="en-US" dirty="0" err="1" smtClean="0"/>
+              <a:t>phải</a:t>
+            </a:r>
+            <a:r>
+              <a:rPr lang="en-US" dirty="0" smtClean="0"/>
+              <a:t> </a:t>
+            </a:r>
+            <a:r>
+              <a:rPr lang="en-US" dirty="0" err="1" smtClean="0"/>
+              <a:t>xử</a:t>
+            </a:r>
+            <a:r>
+              <a:rPr lang="en-US" dirty="0" smtClean="0"/>
+              <a:t> </a:t>
+            </a:r>
+            <a:r>
+              <a:rPr lang="en-US" dirty="0" err="1" smtClean="0"/>
+              <a:t>lý</a:t>
+            </a:r>
+            <a:r>
+              <a:rPr lang="en-US" dirty="0" smtClean="0"/>
+              <a:t> </a:t>
+            </a:r>
+            <a:r>
+              <a:rPr lang="en-US" dirty="0" err="1" smtClean="0"/>
+              <a:t>cục</a:t>
+            </a:r>
+            <a:r>
+              <a:rPr lang="en-US" dirty="0" smtClean="0"/>
+              <a:t> </a:t>
+            </a:r>
+            <a:r>
+              <a:rPr lang="en-US" dirty="0" err="1" smtClean="0"/>
+              <a:t>bộ</a:t>
+            </a:r>
+            <a:r>
+              <a:rPr lang="en-US" dirty="0" smtClean="0"/>
+              <a:t> </a:t>
+            </a:r>
+            <a:r>
+              <a:rPr lang="en-US" dirty="0" err="1" smtClean="0"/>
+              <a:t>lượng</a:t>
+            </a:r>
+            <a:r>
+              <a:rPr lang="en-US" dirty="0" smtClean="0"/>
+              <a:t> </a:t>
+            </a:r>
+            <a:r>
+              <a:rPr lang="en-US" dirty="0" err="1" smtClean="0"/>
+              <a:t>lớn</a:t>
+            </a:r>
+            <a:r>
+              <a:rPr lang="en-US" dirty="0" smtClean="0"/>
+              <a:t> </a:t>
+            </a:r>
+            <a:r>
+              <a:rPr lang="en-US" dirty="0" err="1" smtClean="0"/>
+              <a:t>dữ</a:t>
+            </a:r>
+            <a:r>
+              <a:rPr lang="en-US" dirty="0" smtClean="0"/>
+              <a:t> </a:t>
+            </a:r>
+            <a:r>
+              <a:rPr lang="en-US" dirty="0" err="1" smtClean="0"/>
+              <a:t>liệu</a:t>
+            </a:r>
+            <a:endParaRPr lang="en-US" dirty="0" smtClean="0"/>
+          </a:p>
+          <a:p>
+            <a:pPr marL="624078" indent="-514350">
+              <a:buFont typeface="+mj-lt"/>
+              <a:buAutoNum type="arabicPeriod"/>
+            </a:pPr>
+            <a:r>
+              <a:rPr lang="en-US" dirty="0" err="1" smtClean="0"/>
+              <a:t>Khi</a:t>
+            </a:r>
+            <a:r>
+              <a:rPr lang="en-US" dirty="0" smtClean="0"/>
+              <a:t> </a:t>
+            </a:r>
+            <a:r>
+              <a:rPr lang="en-US" dirty="0" err="1" smtClean="0"/>
+              <a:t>có</a:t>
+            </a:r>
+            <a:r>
+              <a:rPr lang="en-US" dirty="0" smtClean="0"/>
+              <a:t> </a:t>
+            </a:r>
+            <a:r>
+              <a:rPr lang="en-US" dirty="0" err="1" smtClean="0"/>
+              <a:t>sự</a:t>
+            </a:r>
+            <a:r>
+              <a:rPr lang="en-US" dirty="0" smtClean="0"/>
+              <a:t> </a:t>
+            </a:r>
+            <a:r>
+              <a:rPr lang="en-US" dirty="0" err="1" smtClean="0"/>
+              <a:t>cập</a:t>
+            </a:r>
+            <a:r>
+              <a:rPr lang="en-US" dirty="0" smtClean="0"/>
+              <a:t> </a:t>
+            </a:r>
+            <a:r>
+              <a:rPr lang="en-US" dirty="0" err="1" smtClean="0"/>
+              <a:t>nhật</a:t>
+            </a:r>
+            <a:r>
+              <a:rPr lang="en-US" dirty="0" smtClean="0"/>
+              <a:t> </a:t>
+            </a:r>
+            <a:r>
+              <a:rPr lang="en-US" dirty="0" err="1" smtClean="0"/>
+              <a:t>về</a:t>
+            </a:r>
+            <a:r>
+              <a:rPr lang="en-US" dirty="0" smtClean="0"/>
+              <a:t> </a:t>
+            </a:r>
+            <a:r>
+              <a:rPr lang="en-US" dirty="0" err="1" smtClean="0"/>
+              <a:t>cấu</a:t>
+            </a:r>
+            <a:r>
+              <a:rPr lang="en-US" dirty="0" smtClean="0"/>
+              <a:t> </a:t>
+            </a:r>
+            <a:r>
+              <a:rPr lang="en-US" dirty="0" err="1" smtClean="0"/>
+              <a:t>trúc</a:t>
+            </a:r>
+            <a:r>
+              <a:rPr lang="en-US" dirty="0" smtClean="0"/>
+              <a:t> </a:t>
+            </a:r>
+            <a:r>
+              <a:rPr lang="en-US" dirty="0" err="1" smtClean="0"/>
+              <a:t>dữ</a:t>
+            </a:r>
+            <a:r>
+              <a:rPr lang="en-US" dirty="0" smtClean="0"/>
+              <a:t> </a:t>
+            </a:r>
+            <a:r>
+              <a:rPr lang="en-US" dirty="0" err="1" smtClean="0"/>
+              <a:t>liệu</a:t>
+            </a:r>
+            <a:r>
+              <a:rPr lang="en-US" dirty="0" smtClean="0"/>
+              <a:t>, </a:t>
+            </a:r>
+            <a:r>
+              <a:rPr lang="en-US" dirty="0" err="1" smtClean="0"/>
+              <a:t>chương</a:t>
+            </a:r>
+            <a:r>
+              <a:rPr lang="en-US" dirty="0" smtClean="0"/>
+              <a:t> </a:t>
+            </a:r>
+            <a:r>
+              <a:rPr lang="en-US" dirty="0" err="1" smtClean="0"/>
+              <a:t>trình</a:t>
+            </a:r>
+            <a:r>
+              <a:rPr lang="en-US" dirty="0" smtClean="0"/>
+              <a:t> di </a:t>
+            </a:r>
+            <a:r>
+              <a:rPr lang="en-US" dirty="0" err="1" smtClean="0"/>
+              <a:t>động</a:t>
+            </a:r>
+            <a:r>
+              <a:rPr lang="en-US" dirty="0" smtClean="0"/>
+              <a:t> </a:t>
+            </a:r>
+            <a:r>
+              <a:rPr lang="en-US" dirty="0" err="1" smtClean="0"/>
+              <a:t>cần</a:t>
+            </a:r>
+            <a:r>
+              <a:rPr lang="en-US" dirty="0" smtClean="0"/>
+              <a:t> </a:t>
+            </a:r>
+            <a:r>
+              <a:rPr lang="en-US" dirty="0" err="1" smtClean="0"/>
+              <a:t>phải</a:t>
+            </a:r>
+            <a:r>
+              <a:rPr lang="en-US" dirty="0" smtClean="0"/>
+              <a:t> </a:t>
+            </a:r>
+            <a:r>
+              <a:rPr lang="en-US" dirty="0" err="1" smtClean="0"/>
+              <a:t>được</a:t>
+            </a:r>
+            <a:r>
+              <a:rPr lang="en-US" dirty="0" smtClean="0"/>
+              <a:t> </a:t>
+            </a:r>
+            <a:r>
+              <a:rPr lang="en-US" dirty="0" err="1" smtClean="0"/>
+              <a:t>cập</a:t>
+            </a:r>
+            <a:r>
+              <a:rPr lang="en-US" dirty="0" smtClean="0"/>
+              <a:t> </a:t>
+            </a:r>
+            <a:r>
+              <a:rPr lang="en-US" dirty="0" err="1" smtClean="0"/>
+              <a:t>nhật</a:t>
+            </a:r>
+            <a:r>
+              <a:rPr lang="en-US" dirty="0" smtClean="0"/>
+              <a:t> </a:t>
+            </a:r>
+            <a:r>
+              <a:rPr lang="en-US" dirty="0" err="1" smtClean="0"/>
+              <a:t>lại</a:t>
+            </a:r>
+            <a:endParaRPr lang="en-GB" dirty="0"/>
+          </a:p>
+        </p:txBody>
+      </p:sp>
+      <p:sp>
+        <p:nvSpPr>
+          <p:cNvPr id="2" name="Title 1"/>
+          <p:cNvSpPr>
+            <a:spLocks noGrp="1"/>
+          </p:cNvSpPr>
+          <p:nvPr>
+            <p:ph type="title"/>
+          </p:nvPr>
+        </p:nvSpPr>
+        <p:spPr/>
+        <p:txBody>
+          <a:bodyPr/>
+          <a:lstStyle/>
+          <a:p>
+            <a:r>
+              <a:rPr lang="en-US" dirty="0" err="1" smtClean="0">
+                <a:latin typeface="Times New Roman" pitchFamily="18" charset="0"/>
+                <a:cs typeface="Times New Roman" pitchFamily="18" charset="0"/>
+              </a:rPr>
+              <a:t>Thiết</a:t>
+            </a:r>
+            <a:r>
+              <a:rPr lang="en-US" dirty="0" smtClean="0">
+                <a:latin typeface="Times New Roman" pitchFamily="18" charset="0"/>
+                <a:cs typeface="Times New Roman" pitchFamily="18" charset="0"/>
+              </a:rPr>
+              <a:t> </a:t>
+            </a:r>
+            <a:r>
+              <a:rPr lang="en-US" dirty="0" err="1" smtClean="0">
+                <a:latin typeface="Times New Roman" pitchFamily="18" charset="0"/>
+                <a:cs typeface="Times New Roman" pitchFamily="18" charset="0"/>
+              </a:rPr>
+              <a:t>kế</a:t>
+            </a:r>
+            <a:r>
+              <a:rPr lang="en-US" dirty="0" smtClean="0">
+                <a:latin typeface="Times New Roman" pitchFamily="18" charset="0"/>
+                <a:cs typeface="Times New Roman" pitchFamily="18" charset="0"/>
+              </a:rPr>
+              <a:t> </a:t>
+            </a:r>
+            <a:r>
+              <a:rPr lang="en-US" dirty="0" err="1" smtClean="0">
+                <a:latin typeface="Times New Roman" pitchFamily="18" charset="0"/>
+                <a:cs typeface="Times New Roman" pitchFamily="18" charset="0"/>
+              </a:rPr>
+              <a:t>hệ</a:t>
+            </a:r>
+            <a:r>
+              <a:rPr lang="en-US" dirty="0" smtClean="0">
+                <a:latin typeface="Times New Roman" pitchFamily="18" charset="0"/>
+                <a:cs typeface="Times New Roman" pitchFamily="18" charset="0"/>
+              </a:rPr>
+              <a:t> </a:t>
+            </a:r>
+            <a:r>
+              <a:rPr lang="en-US" dirty="0" err="1" smtClean="0">
+                <a:latin typeface="Times New Roman" pitchFamily="18" charset="0"/>
+                <a:cs typeface="Times New Roman" pitchFamily="18" charset="0"/>
+              </a:rPr>
+              <a:t>thống</a:t>
+            </a:r>
+            <a:endParaRPr lang="en-GB" dirty="0">
+              <a:latin typeface="Times New Roman" pitchFamily="18" charset="0"/>
+              <a:cs typeface="Times New Roman" pitchFamily="18" charset="0"/>
+            </a:endParaRPr>
+          </a:p>
+        </p:txBody>
+      </p:sp>
+    </p:spTree>
+    <p:extLst>
+      <p:ext uri="{BB962C8B-B14F-4D97-AF65-F5344CB8AC3E}">
+        <p14:creationId xmlns:p14="http://schemas.microsoft.com/office/powerpoint/2010/main" val="839877503"/>
+      </p:ext>
+    </p:extLst>
+  </p:cSld>
+  <p:clrMapOvr>
+    <a:masterClrMapping/>
+  </p:clrMapOvr>
+  <p:timing>
+    <p:tnLst>
+      <p:par>
+        <p:cTn id="1" dur="indefinite" restart="never" nodeType="tmRoot"/>
+      </p:par>
+    </p:tnLst>
+  </p:timing>
+</p:sld>
+</file>
+
+<file path=ppt/slides/slide5.xml><?xml version="1.0" encoding="utf-8"?>
+<p:sld xmlns:a="http://schemas.openxmlformats.org/drawingml/2006/main" xmlns:r="http://schemas.openxmlformats.org/officeDocument/2006/relationships" xmlns:p="http://schemas.openxmlformats.org/presentationml/2006/main">
+  <p:cSld>
+    <p:spTree>
+      <p:nvGrpSpPr>
+        <p:cNvPr id="1" name=""/>
+        <p:cNvGrpSpPr/>
+        <p:nvPr/>
+      </p:nvGrpSpPr>
+      <p:grpSpPr>
+        <a:xfrm>
+          <a:off x="0" y="0"/>
+          <a:ext cx="0" cy="0"/>
+          <a:chOff x="0" y="0"/>
+          <a:chExt cx="0" cy="0"/>
+        </a:xfrm>
+      </p:grpSpPr>
+      <p:sp>
+        <p:nvSpPr>
+          <p:cNvPr id="2" name="Content Placeholder 1"/>
+          <p:cNvSpPr>
+            <a:spLocks noGrp="1"/>
+          </p:cNvSpPr>
+          <p:nvPr>
+            <p:ph idx="1"/>
+          </p:nvPr>
+        </p:nvSpPr>
+        <p:spPr/>
+        <p:txBody>
+          <a:bodyPr/>
+          <a:lstStyle/>
+          <a:p>
+            <a:endParaRPr lang="en-GB" dirty="0"/>
+          </a:p>
+        </p:txBody>
+      </p:sp>
+      <p:sp>
+        <p:nvSpPr>
+          <p:cNvPr id="3" name="Title 2"/>
+          <p:cNvSpPr>
+            <a:spLocks noGrp="1"/>
+          </p:cNvSpPr>
+          <p:nvPr>
+            <p:ph type="title"/>
+          </p:nvPr>
+        </p:nvSpPr>
+        <p:spPr/>
+        <p:txBody>
+          <a:bodyPr/>
+          <a:lstStyle/>
+          <a:p>
+            <a:r>
+              <a:rPr lang="en-US" dirty="0" smtClean="0"/>
+              <a:t>Web server</a:t>
+            </a:r>
+            <a:endParaRPr lang="en-GB" dirty="0"/>
+          </a:p>
+        </p:txBody>
+      </p:sp>
+      <p:pic>
+        <p:nvPicPr>
+          <p:cNvPr id="1026" name="Picture 2" descr="Image result for database icon"/>
+          <p:cNvPicPr>
+            <a:picLocks noChangeAspect="1" noChangeArrowheads="1"/>
+          </p:cNvPicPr>
+          <p:nvPr/>
+        </p:nvPicPr>
+        <p:blipFill>
+          <a:blip r:embed="rId2" cstate="print">
+            <a:extLst>
+              <a:ext uri="{28A0092B-C50C-407E-A947-70E740481C1C}">
+                <a14:useLocalDpi xmlns:a14="http://schemas.microsoft.com/office/drawing/2010/main" val="0"/>
+              </a:ext>
+            </a:extLst>
+          </a:blip>
+          <a:srcRect/>
+          <a:stretch>
+            <a:fillRect/>
+          </a:stretch>
+        </p:blipFill>
+        <p:spPr bwMode="auto">
+          <a:xfrm>
+            <a:off x="7010400" y="2962685"/>
+            <a:ext cx="1524001" cy="1524001"/>
+          </a:xfrm>
+          <a:prstGeom prst="rect">
+            <a:avLst/>
+          </a:prstGeom>
+          <a:noFill/>
+          <a:extLst>
+            <a:ext uri="{909E8E84-426E-40DD-AFC4-6F175D3DCCD1}">
+              <a14:hiddenFill xmlns:a14="http://schemas.microsoft.com/office/drawing/2010/main">
+                <a:solidFill>
+                  <a:srgbClr val="FFFFFF"/>
+                </a:solidFill>
+              </a14:hiddenFill>
+            </a:ext>
+          </a:extLst>
+        </p:spPr>
+      </p:pic>
+      <p:pic>
+        <p:nvPicPr>
+          <p:cNvPr id="5" name="Picture 6" descr="Server, Hosting, network, Multimedia, Database, Computer, files, storage, Servers, technology Icon"/>
+          <p:cNvPicPr>
+            <a:picLocks noChangeAspect="1" noChangeArrowheads="1"/>
+          </p:cNvPicPr>
+          <p:nvPr/>
+        </p:nvPicPr>
+        <p:blipFill>
+          <a:blip r:embed="rId3">
+            <a:extLst>
+              <a:ext uri="{28A0092B-C50C-407E-A947-70E740481C1C}">
+                <a14:useLocalDpi xmlns:a14="http://schemas.microsoft.com/office/drawing/2010/main" val="0"/>
+              </a:ext>
+            </a:extLst>
+          </a:blip>
+          <a:srcRect/>
+          <a:stretch>
+            <a:fillRect/>
+          </a:stretch>
+        </p:blipFill>
+        <p:spPr bwMode="auto">
+          <a:xfrm>
+            <a:off x="990600" y="2962684"/>
+            <a:ext cx="1524000" cy="1524001"/>
+          </a:xfrm>
+          <a:prstGeom prst="rect">
+            <a:avLst/>
+          </a:prstGeom>
+          <a:noFill/>
+          <a:extLst>
+            <a:ext uri="{909E8E84-426E-40DD-AFC4-6F175D3DCCD1}">
+              <a14:hiddenFill xmlns:a14="http://schemas.microsoft.com/office/drawing/2010/main">
+                <a:solidFill>
+                  <a:srgbClr val="FFFFFF"/>
+                </a:solidFill>
+              </a14:hiddenFill>
+            </a:ext>
+          </a:extLst>
+        </p:spPr>
+      </p:pic>
+      <p:sp>
+        <p:nvSpPr>
+          <p:cNvPr id="6" name="TextBox 5"/>
+          <p:cNvSpPr txBox="1"/>
+          <p:nvPr/>
+        </p:nvSpPr>
+        <p:spPr>
+          <a:xfrm>
+            <a:off x="1042309" y="4521322"/>
+            <a:ext cx="1420582" cy="369332"/>
+          </a:xfrm>
+          <a:prstGeom prst="rect">
+            <a:avLst/>
+          </a:prstGeom>
+          <a:noFill/>
+        </p:spPr>
+        <p:txBody>
+          <a:bodyPr wrap="none" rtlCol="0">
+            <a:spAutoFit/>
+          </a:bodyPr>
+          <a:lstStyle/>
+          <a:p>
+            <a:r>
+              <a:rPr lang="en-US" dirty="0" smtClean="0"/>
+              <a:t>Web Server</a:t>
+            </a:r>
+            <a:endParaRPr lang="en-GB" dirty="0"/>
+          </a:p>
+        </p:txBody>
+      </p:sp>
+      <p:sp>
+        <p:nvSpPr>
+          <p:cNvPr id="7" name="TextBox 6"/>
+          <p:cNvSpPr txBox="1"/>
+          <p:nvPr/>
+        </p:nvSpPr>
+        <p:spPr>
+          <a:xfrm>
+            <a:off x="7162297" y="4521322"/>
+            <a:ext cx="1220206" cy="369332"/>
+          </a:xfrm>
+          <a:prstGeom prst="rect">
+            <a:avLst/>
+          </a:prstGeom>
+          <a:noFill/>
+        </p:spPr>
+        <p:txBody>
+          <a:bodyPr wrap="none" rtlCol="0">
+            <a:spAutoFit/>
+          </a:bodyPr>
+          <a:lstStyle/>
+          <a:p>
+            <a:r>
+              <a:rPr lang="en-US" dirty="0" smtClean="0"/>
+              <a:t>Database</a:t>
+            </a:r>
+            <a:endParaRPr lang="en-GB" dirty="0"/>
+          </a:p>
+        </p:txBody>
+      </p:sp>
+      <p:pic>
+        <p:nvPicPr>
+          <p:cNvPr id="1028" name="Picture 4" descr="Image result for controller icon mvc"/>
+          <p:cNvPicPr>
+            <a:picLocks noChangeAspect="1" noChangeArrowheads="1"/>
+          </p:cNvPicPr>
+          <p:nvPr/>
+        </p:nvPicPr>
+        <p:blipFill>
+          <a:blip r:embed="rId4">
+            <a:extLst>
+              <a:ext uri="{28A0092B-C50C-407E-A947-70E740481C1C}">
+                <a14:useLocalDpi xmlns:a14="http://schemas.microsoft.com/office/drawing/2010/main" val="0"/>
+              </a:ext>
+            </a:extLst>
+          </a:blip>
+          <a:srcRect/>
+          <a:stretch>
+            <a:fillRect/>
+          </a:stretch>
+        </p:blipFill>
+        <p:spPr bwMode="auto">
+          <a:xfrm>
+            <a:off x="3940733" y="2962684"/>
+            <a:ext cx="1558638" cy="1558638"/>
+          </a:xfrm>
+          <a:prstGeom prst="rect">
+            <a:avLst/>
+          </a:prstGeom>
+          <a:noFill/>
+          <a:extLst>
+            <a:ext uri="{909E8E84-426E-40DD-AFC4-6F175D3DCCD1}">
+              <a14:hiddenFill xmlns:a14="http://schemas.microsoft.com/office/drawing/2010/main">
+                <a:solidFill>
+                  <a:srgbClr val="FFFFFF"/>
+                </a:solidFill>
+              </a14:hiddenFill>
+            </a:ext>
+          </a:extLst>
+        </p:spPr>
+      </p:pic>
+      <p:sp>
+        <p:nvSpPr>
+          <p:cNvPr id="9" name="TextBox 8"/>
+          <p:cNvSpPr txBox="1"/>
+          <p:nvPr/>
+        </p:nvSpPr>
+        <p:spPr>
+          <a:xfrm>
+            <a:off x="4065866" y="4521322"/>
+            <a:ext cx="1308371" cy="369332"/>
+          </a:xfrm>
+          <a:prstGeom prst="rect">
+            <a:avLst/>
+          </a:prstGeom>
+          <a:noFill/>
+        </p:spPr>
+        <p:txBody>
+          <a:bodyPr wrap="none" rtlCol="0">
+            <a:spAutoFit/>
+          </a:bodyPr>
+          <a:lstStyle/>
+          <a:p>
+            <a:r>
+              <a:rPr lang="en-US" dirty="0" smtClean="0"/>
+              <a:t>Controller</a:t>
+            </a:r>
+            <a:endParaRPr lang="en-GB" dirty="0"/>
+          </a:p>
+        </p:txBody>
+      </p:sp>
+      <p:cxnSp>
+        <p:nvCxnSpPr>
+          <p:cNvPr id="8" name="Straight Arrow Connector 7"/>
+          <p:cNvCxnSpPr/>
+          <p:nvPr/>
+        </p:nvCxnSpPr>
+        <p:spPr>
+          <a:xfrm>
+            <a:off x="152400" y="3352800"/>
+            <a:ext cx="762000" cy="0"/>
+          </a:xfrm>
+          <a:prstGeom prst="straightConnector1">
+            <a:avLst/>
+          </a:prstGeom>
+          <a:ln>
+            <a:tailEnd type="arrow"/>
+          </a:ln>
+        </p:spPr>
+        <p:style>
+          <a:lnRef idx="1">
+            <a:schemeClr val="accent1"/>
+          </a:lnRef>
+          <a:fillRef idx="0">
+            <a:schemeClr val="accent1"/>
+          </a:fillRef>
+          <a:effectRef idx="0">
+            <a:schemeClr val="accent1"/>
+          </a:effectRef>
+          <a:fontRef idx="minor">
+            <a:schemeClr val="tx1"/>
+          </a:fontRef>
+        </p:style>
+      </p:cxnSp>
+      <p:sp>
+        <p:nvSpPr>
+          <p:cNvPr id="10" name="TextBox 9"/>
+          <p:cNvSpPr txBox="1"/>
+          <p:nvPr/>
+        </p:nvSpPr>
+        <p:spPr>
+          <a:xfrm>
+            <a:off x="41919" y="3213556"/>
+            <a:ext cx="982961" cy="215444"/>
+          </a:xfrm>
+          <a:prstGeom prst="rect">
+            <a:avLst/>
+          </a:prstGeom>
+          <a:noFill/>
+        </p:spPr>
+        <p:txBody>
+          <a:bodyPr wrap="none" rtlCol="0">
+            <a:spAutoFit/>
+          </a:bodyPr>
+          <a:lstStyle/>
+          <a:p>
+            <a:r>
+              <a:rPr lang="en-US" sz="800" dirty="0" smtClean="0"/>
+              <a:t>Website request</a:t>
+            </a:r>
+            <a:endParaRPr lang="en-GB" sz="800" dirty="0"/>
+          </a:p>
+        </p:txBody>
+      </p:sp>
+      <p:cxnSp>
+        <p:nvCxnSpPr>
+          <p:cNvPr id="13" name="Straight Arrow Connector 12"/>
+          <p:cNvCxnSpPr/>
+          <p:nvPr/>
+        </p:nvCxnSpPr>
+        <p:spPr>
+          <a:xfrm>
+            <a:off x="2667000" y="3352800"/>
+            <a:ext cx="1273733" cy="0"/>
+          </a:xfrm>
+          <a:prstGeom prst="straightConnector1">
+            <a:avLst/>
+          </a:prstGeom>
+          <a:ln>
+            <a:tailEnd type="arrow"/>
+          </a:ln>
+        </p:spPr>
+        <p:style>
+          <a:lnRef idx="1">
+            <a:schemeClr val="accent1"/>
+          </a:lnRef>
+          <a:fillRef idx="0">
+            <a:schemeClr val="accent1"/>
+          </a:fillRef>
+          <a:effectRef idx="0">
+            <a:schemeClr val="accent1"/>
+          </a:effectRef>
+          <a:fontRef idx="minor">
+            <a:schemeClr val="tx1"/>
+          </a:fontRef>
+        </p:style>
+      </p:cxnSp>
+      <p:cxnSp>
+        <p:nvCxnSpPr>
+          <p:cNvPr id="15" name="Straight Arrow Connector 14"/>
+          <p:cNvCxnSpPr/>
+          <p:nvPr/>
+        </p:nvCxnSpPr>
+        <p:spPr>
+          <a:xfrm flipH="1">
+            <a:off x="2667000" y="3505200"/>
+            <a:ext cx="1273734" cy="0"/>
+          </a:xfrm>
+          <a:prstGeom prst="straightConnector1">
+            <a:avLst/>
+          </a:prstGeom>
+          <a:ln>
+            <a:tailEnd type="arrow"/>
+          </a:ln>
+        </p:spPr>
+        <p:style>
+          <a:lnRef idx="1">
+            <a:schemeClr val="accent1"/>
+          </a:lnRef>
+          <a:fillRef idx="0">
+            <a:schemeClr val="accent1"/>
+          </a:fillRef>
+          <a:effectRef idx="0">
+            <a:schemeClr val="accent1"/>
+          </a:effectRef>
+          <a:fontRef idx="minor">
+            <a:schemeClr val="tx1"/>
+          </a:fontRef>
+        </p:style>
+      </p:cxnSp>
+      <p:cxnSp>
+        <p:nvCxnSpPr>
+          <p:cNvPr id="18" name="Straight Arrow Connector 17"/>
+          <p:cNvCxnSpPr/>
+          <p:nvPr/>
+        </p:nvCxnSpPr>
+        <p:spPr>
+          <a:xfrm>
+            <a:off x="5638800" y="3352800"/>
+            <a:ext cx="1273733" cy="0"/>
+          </a:xfrm>
+          <a:prstGeom prst="straightConnector1">
+            <a:avLst/>
+          </a:prstGeom>
+          <a:ln>
+            <a:tailEnd type="arrow"/>
+          </a:ln>
+        </p:spPr>
+        <p:style>
+          <a:lnRef idx="1">
+            <a:schemeClr val="accent1"/>
+          </a:lnRef>
+          <a:fillRef idx="0">
+            <a:schemeClr val="accent1"/>
+          </a:fillRef>
+          <a:effectRef idx="0">
+            <a:schemeClr val="accent1"/>
+          </a:effectRef>
+          <a:fontRef idx="minor">
+            <a:schemeClr val="tx1"/>
+          </a:fontRef>
+        </p:style>
+      </p:cxnSp>
+      <p:sp>
+        <p:nvSpPr>
+          <p:cNvPr id="19" name="TextBox 18"/>
+          <p:cNvSpPr txBox="1"/>
+          <p:nvPr/>
+        </p:nvSpPr>
+        <p:spPr>
+          <a:xfrm>
+            <a:off x="5551263" y="3213556"/>
+            <a:ext cx="1361270" cy="215444"/>
+          </a:xfrm>
+          <a:prstGeom prst="rect">
+            <a:avLst/>
+          </a:prstGeom>
+          <a:noFill/>
+        </p:spPr>
+        <p:txBody>
+          <a:bodyPr wrap="none" rtlCol="0">
+            <a:spAutoFit/>
+          </a:bodyPr>
+          <a:lstStyle/>
+          <a:p>
+            <a:r>
+              <a:rPr lang="en-US" sz="800" dirty="0" smtClean="0"/>
+              <a:t>Get data for index page</a:t>
+            </a:r>
+            <a:endParaRPr lang="en-GB" sz="800" dirty="0"/>
+          </a:p>
+        </p:txBody>
+      </p:sp>
+      <p:cxnSp>
+        <p:nvCxnSpPr>
+          <p:cNvPr id="20" name="Straight Arrow Connector 19"/>
+          <p:cNvCxnSpPr/>
+          <p:nvPr/>
+        </p:nvCxnSpPr>
+        <p:spPr>
+          <a:xfrm flipH="1">
+            <a:off x="5638800" y="3505200"/>
+            <a:ext cx="1273734" cy="0"/>
+          </a:xfrm>
+          <a:prstGeom prst="straightConnector1">
+            <a:avLst/>
+          </a:prstGeom>
+          <a:ln>
+            <a:tailEnd type="arrow"/>
+          </a:ln>
+        </p:spPr>
+        <p:style>
+          <a:lnRef idx="1">
+            <a:schemeClr val="accent1"/>
+          </a:lnRef>
+          <a:fillRef idx="0">
+            <a:schemeClr val="accent1"/>
+          </a:fillRef>
+          <a:effectRef idx="0">
+            <a:schemeClr val="accent1"/>
+          </a:effectRef>
+          <a:fontRef idx="minor">
+            <a:schemeClr val="tx1"/>
+          </a:fontRef>
+        </p:style>
+      </p:cxnSp>
+      <p:cxnSp>
+        <p:nvCxnSpPr>
+          <p:cNvPr id="21" name="Straight Arrow Connector 20"/>
+          <p:cNvCxnSpPr/>
+          <p:nvPr/>
+        </p:nvCxnSpPr>
+        <p:spPr>
+          <a:xfrm flipH="1">
+            <a:off x="152400" y="3505200"/>
+            <a:ext cx="762000" cy="0"/>
+          </a:xfrm>
+          <a:prstGeom prst="straightConnector1">
+            <a:avLst/>
+          </a:prstGeom>
+          <a:ln>
+            <a:tailEnd type="arrow"/>
+          </a:ln>
+        </p:spPr>
+        <p:style>
+          <a:lnRef idx="1">
+            <a:schemeClr val="accent1"/>
+          </a:lnRef>
+          <a:fillRef idx="0">
+            <a:schemeClr val="accent1"/>
+          </a:fillRef>
+          <a:effectRef idx="0">
+            <a:schemeClr val="accent1"/>
+          </a:effectRef>
+          <a:fontRef idx="minor">
+            <a:schemeClr val="tx1"/>
+          </a:fontRef>
+        </p:style>
+      </p:cxnSp>
+      <p:cxnSp>
+        <p:nvCxnSpPr>
+          <p:cNvPr id="33" name="Straight Arrow Connector 32"/>
+          <p:cNvCxnSpPr/>
+          <p:nvPr/>
+        </p:nvCxnSpPr>
+        <p:spPr>
+          <a:xfrm>
+            <a:off x="152400" y="4009694"/>
+            <a:ext cx="762000" cy="0"/>
+          </a:xfrm>
+          <a:prstGeom prst="straightConnector1">
+            <a:avLst/>
+          </a:prstGeom>
+          <a:ln>
+            <a:solidFill>
+              <a:srgbClr val="FF0000"/>
+            </a:solidFill>
+            <a:tailEnd type="arrow"/>
+          </a:ln>
+        </p:spPr>
+        <p:style>
+          <a:lnRef idx="1">
+            <a:schemeClr val="accent1"/>
+          </a:lnRef>
+          <a:fillRef idx="0">
+            <a:schemeClr val="accent1"/>
+          </a:fillRef>
+          <a:effectRef idx="0">
+            <a:schemeClr val="accent1"/>
+          </a:effectRef>
+          <a:fontRef idx="minor">
+            <a:schemeClr val="tx1"/>
+          </a:fontRef>
+        </p:style>
+      </p:cxnSp>
+      <p:sp>
+        <p:nvSpPr>
+          <p:cNvPr id="34" name="TextBox 33"/>
+          <p:cNvSpPr txBox="1"/>
+          <p:nvPr/>
+        </p:nvSpPr>
+        <p:spPr>
+          <a:xfrm>
+            <a:off x="122106" y="3859253"/>
+            <a:ext cx="821059" cy="215444"/>
+          </a:xfrm>
+          <a:prstGeom prst="rect">
+            <a:avLst/>
+          </a:prstGeom>
+          <a:noFill/>
+        </p:spPr>
+        <p:txBody>
+          <a:bodyPr wrap="none" rtlCol="0">
+            <a:spAutoFit/>
+          </a:bodyPr>
+          <a:lstStyle/>
+          <a:p>
+            <a:r>
+              <a:rPr lang="en-US" sz="800" dirty="0" smtClean="0"/>
+              <a:t>Data request</a:t>
+            </a:r>
+            <a:endParaRPr lang="en-GB" sz="800" dirty="0"/>
+          </a:p>
+        </p:txBody>
+      </p:sp>
+      <p:cxnSp>
+        <p:nvCxnSpPr>
+          <p:cNvPr id="35" name="Straight Arrow Connector 34"/>
+          <p:cNvCxnSpPr/>
+          <p:nvPr/>
+        </p:nvCxnSpPr>
+        <p:spPr>
+          <a:xfrm>
+            <a:off x="2667000" y="4009694"/>
+            <a:ext cx="1273733" cy="0"/>
+          </a:xfrm>
+          <a:prstGeom prst="straightConnector1">
+            <a:avLst/>
+          </a:prstGeom>
+          <a:ln>
+            <a:solidFill>
+              <a:srgbClr val="FF0000"/>
+            </a:solidFill>
+            <a:tailEnd type="arrow"/>
+          </a:ln>
+        </p:spPr>
+        <p:style>
+          <a:lnRef idx="1">
+            <a:schemeClr val="accent1"/>
+          </a:lnRef>
+          <a:fillRef idx="0">
+            <a:schemeClr val="accent1"/>
+          </a:fillRef>
+          <a:effectRef idx="0">
+            <a:schemeClr val="accent1"/>
+          </a:effectRef>
+          <a:fontRef idx="minor">
+            <a:schemeClr val="tx1"/>
+          </a:fontRef>
+        </p:style>
+      </p:cxnSp>
+      <p:cxnSp>
+        <p:nvCxnSpPr>
+          <p:cNvPr id="36" name="Straight Arrow Connector 35"/>
+          <p:cNvCxnSpPr/>
+          <p:nvPr/>
+        </p:nvCxnSpPr>
+        <p:spPr>
+          <a:xfrm flipH="1">
+            <a:off x="2667000" y="4162094"/>
+            <a:ext cx="1273734" cy="0"/>
+          </a:xfrm>
+          <a:prstGeom prst="straightConnector1">
+            <a:avLst/>
+          </a:prstGeom>
+          <a:ln>
+            <a:solidFill>
+              <a:srgbClr val="FF0000"/>
+            </a:solidFill>
+            <a:tailEnd type="arrow"/>
+          </a:ln>
+        </p:spPr>
+        <p:style>
+          <a:lnRef idx="1">
+            <a:schemeClr val="accent1"/>
+          </a:lnRef>
+          <a:fillRef idx="0">
+            <a:schemeClr val="accent1"/>
+          </a:fillRef>
+          <a:effectRef idx="0">
+            <a:schemeClr val="accent1"/>
+          </a:effectRef>
+          <a:fontRef idx="minor">
+            <a:schemeClr val="tx1"/>
+          </a:fontRef>
+        </p:style>
+      </p:cxnSp>
+      <p:cxnSp>
+        <p:nvCxnSpPr>
+          <p:cNvPr id="37" name="Straight Arrow Connector 36"/>
+          <p:cNvCxnSpPr/>
+          <p:nvPr/>
+        </p:nvCxnSpPr>
+        <p:spPr>
+          <a:xfrm>
+            <a:off x="5638800" y="4009694"/>
+            <a:ext cx="1273733" cy="0"/>
+          </a:xfrm>
+          <a:prstGeom prst="straightConnector1">
+            <a:avLst/>
+          </a:prstGeom>
+          <a:ln>
+            <a:solidFill>
+              <a:srgbClr val="FF0000"/>
+            </a:solidFill>
+            <a:tailEnd type="arrow"/>
+          </a:ln>
+        </p:spPr>
+        <p:style>
+          <a:lnRef idx="1">
+            <a:schemeClr val="accent1"/>
+          </a:lnRef>
+          <a:fillRef idx="0">
+            <a:schemeClr val="accent1"/>
+          </a:fillRef>
+          <a:effectRef idx="0">
+            <a:schemeClr val="accent1"/>
+          </a:effectRef>
+          <a:fontRef idx="minor">
+            <a:schemeClr val="tx1"/>
+          </a:fontRef>
+        </p:style>
+      </p:cxnSp>
+      <p:sp>
+        <p:nvSpPr>
+          <p:cNvPr id="38" name="TextBox 37"/>
+          <p:cNvSpPr txBox="1"/>
+          <p:nvPr/>
+        </p:nvSpPr>
+        <p:spPr>
+          <a:xfrm>
+            <a:off x="5551263" y="3857931"/>
+            <a:ext cx="1306768" cy="215444"/>
+          </a:xfrm>
+          <a:prstGeom prst="rect">
+            <a:avLst/>
+          </a:prstGeom>
+          <a:noFill/>
+        </p:spPr>
+        <p:txBody>
+          <a:bodyPr wrap="none" rtlCol="0">
+            <a:spAutoFit/>
+          </a:bodyPr>
+          <a:lstStyle/>
+          <a:p>
+            <a:r>
+              <a:rPr lang="en-US" sz="800" dirty="0" smtClean="0"/>
+              <a:t>Get data for requested</a:t>
+            </a:r>
+            <a:endParaRPr lang="en-GB" sz="800" dirty="0"/>
+          </a:p>
+        </p:txBody>
+      </p:sp>
+      <p:cxnSp>
+        <p:nvCxnSpPr>
+          <p:cNvPr id="39" name="Straight Arrow Connector 38"/>
+          <p:cNvCxnSpPr/>
+          <p:nvPr/>
+        </p:nvCxnSpPr>
+        <p:spPr>
+          <a:xfrm flipH="1">
+            <a:off x="5638800" y="4162094"/>
+            <a:ext cx="1273734" cy="0"/>
+          </a:xfrm>
+          <a:prstGeom prst="straightConnector1">
+            <a:avLst/>
+          </a:prstGeom>
+          <a:ln>
+            <a:solidFill>
+              <a:srgbClr val="FF0000"/>
+            </a:solidFill>
+            <a:tailEnd type="arrow"/>
+          </a:ln>
+        </p:spPr>
+        <p:style>
+          <a:lnRef idx="1">
+            <a:schemeClr val="accent1"/>
+          </a:lnRef>
+          <a:fillRef idx="0">
+            <a:schemeClr val="accent1"/>
+          </a:fillRef>
+          <a:effectRef idx="0">
+            <a:schemeClr val="accent1"/>
+          </a:effectRef>
+          <a:fontRef idx="minor">
+            <a:schemeClr val="tx1"/>
+          </a:fontRef>
+        </p:style>
+      </p:cxnSp>
+      <p:cxnSp>
+        <p:nvCxnSpPr>
+          <p:cNvPr id="40" name="Straight Arrow Connector 39"/>
+          <p:cNvCxnSpPr/>
+          <p:nvPr/>
+        </p:nvCxnSpPr>
+        <p:spPr>
+          <a:xfrm flipH="1">
+            <a:off x="152400" y="4162094"/>
+            <a:ext cx="762000" cy="0"/>
+          </a:xfrm>
+          <a:prstGeom prst="straightConnector1">
+            <a:avLst/>
+          </a:prstGeom>
+          <a:ln>
+            <a:solidFill>
+              <a:srgbClr val="FF0000"/>
+            </a:solidFill>
+            <a:tailEnd type="arrow"/>
+          </a:ln>
+        </p:spPr>
+        <p:style>
+          <a:lnRef idx="1">
+            <a:schemeClr val="accent1"/>
+          </a:lnRef>
+          <a:fillRef idx="0">
+            <a:schemeClr val="accent1"/>
+          </a:fillRef>
+          <a:effectRef idx="0">
+            <a:schemeClr val="accent1"/>
+          </a:effectRef>
+          <a:fontRef idx="minor">
+            <a:schemeClr val="tx1"/>
+          </a:fontRef>
+        </p:style>
+      </p:cxnSp>
+      <p:sp>
+        <p:nvSpPr>
+          <p:cNvPr id="41" name="TextBox 40"/>
+          <p:cNvSpPr txBox="1"/>
+          <p:nvPr/>
+        </p:nvSpPr>
+        <p:spPr>
+          <a:xfrm>
+            <a:off x="215042" y="3365956"/>
+            <a:ext cx="636713" cy="215444"/>
+          </a:xfrm>
+          <a:prstGeom prst="rect">
+            <a:avLst/>
+          </a:prstGeom>
+          <a:noFill/>
+        </p:spPr>
+        <p:txBody>
+          <a:bodyPr wrap="none" rtlCol="0">
+            <a:spAutoFit/>
+          </a:bodyPr>
+          <a:lstStyle/>
+          <a:p>
+            <a:r>
+              <a:rPr lang="en-US" sz="800" dirty="0" smtClean="0"/>
+              <a:t>Webpage</a:t>
+            </a:r>
+            <a:endParaRPr lang="en-GB" sz="800" dirty="0"/>
+          </a:p>
+        </p:txBody>
+      </p:sp>
+      <p:sp>
+        <p:nvSpPr>
+          <p:cNvPr id="42" name="TextBox 41"/>
+          <p:cNvSpPr txBox="1"/>
+          <p:nvPr/>
+        </p:nvSpPr>
+        <p:spPr>
+          <a:xfrm>
+            <a:off x="5610225" y="3352800"/>
+            <a:ext cx="1172116" cy="215444"/>
+          </a:xfrm>
+          <a:prstGeom prst="rect">
+            <a:avLst/>
+          </a:prstGeom>
+          <a:noFill/>
+        </p:spPr>
+        <p:txBody>
+          <a:bodyPr wrap="none" rtlCol="0">
+            <a:spAutoFit/>
+          </a:bodyPr>
+          <a:lstStyle/>
+          <a:p>
+            <a:r>
+              <a:rPr lang="en-US" sz="800" dirty="0" smtClean="0"/>
+              <a:t>Data for index page</a:t>
+            </a:r>
+            <a:endParaRPr lang="en-GB" sz="800" dirty="0"/>
+          </a:p>
+        </p:txBody>
+      </p:sp>
+      <p:sp>
+        <p:nvSpPr>
+          <p:cNvPr id="43" name="TextBox 42"/>
+          <p:cNvSpPr txBox="1"/>
+          <p:nvPr/>
+        </p:nvSpPr>
+        <p:spPr>
+          <a:xfrm>
+            <a:off x="2812385" y="3213556"/>
+            <a:ext cx="982961" cy="215444"/>
+          </a:xfrm>
+          <a:prstGeom prst="rect">
+            <a:avLst/>
+          </a:prstGeom>
+          <a:noFill/>
+        </p:spPr>
+        <p:txBody>
+          <a:bodyPr wrap="none" rtlCol="0">
+            <a:spAutoFit/>
+          </a:bodyPr>
+          <a:lstStyle/>
+          <a:p>
+            <a:r>
+              <a:rPr lang="en-US" sz="800" dirty="0" smtClean="0"/>
+              <a:t>Website request</a:t>
+            </a:r>
+            <a:endParaRPr lang="en-GB" sz="800" dirty="0"/>
+          </a:p>
+        </p:txBody>
+      </p:sp>
+      <p:sp>
+        <p:nvSpPr>
+          <p:cNvPr id="44" name="TextBox 43"/>
+          <p:cNvSpPr txBox="1"/>
+          <p:nvPr/>
+        </p:nvSpPr>
+        <p:spPr>
+          <a:xfrm>
+            <a:off x="2812385" y="3362325"/>
+            <a:ext cx="1112805" cy="215444"/>
+          </a:xfrm>
+          <a:prstGeom prst="rect">
+            <a:avLst/>
+          </a:prstGeom>
+          <a:noFill/>
+        </p:spPr>
+        <p:txBody>
+          <a:bodyPr wrap="none" rtlCol="0">
+            <a:spAutoFit/>
+          </a:bodyPr>
+          <a:lstStyle/>
+          <a:p>
+            <a:r>
+              <a:rPr lang="en-US" sz="800" dirty="0" smtClean="0"/>
+              <a:t>Data and Webpage</a:t>
+            </a:r>
+            <a:endParaRPr lang="en-GB" sz="800" dirty="0"/>
+          </a:p>
+        </p:txBody>
+      </p:sp>
+      <p:sp>
+        <p:nvSpPr>
+          <p:cNvPr id="45" name="TextBox 44"/>
+          <p:cNvSpPr txBox="1"/>
+          <p:nvPr/>
+        </p:nvSpPr>
+        <p:spPr>
+          <a:xfrm>
+            <a:off x="2866084" y="3857472"/>
+            <a:ext cx="821059" cy="215444"/>
+          </a:xfrm>
+          <a:prstGeom prst="rect">
+            <a:avLst/>
+          </a:prstGeom>
+          <a:noFill/>
+        </p:spPr>
+        <p:txBody>
+          <a:bodyPr wrap="none" rtlCol="0">
+            <a:spAutoFit/>
+          </a:bodyPr>
+          <a:lstStyle/>
+          <a:p>
+            <a:r>
+              <a:rPr lang="en-US" sz="800" dirty="0"/>
+              <a:t>D</a:t>
+            </a:r>
+            <a:r>
+              <a:rPr lang="en-US" sz="800" dirty="0" smtClean="0"/>
+              <a:t>ata request</a:t>
+            </a:r>
+            <a:endParaRPr lang="en-GB" sz="800" dirty="0"/>
+          </a:p>
+        </p:txBody>
+      </p:sp>
+      <p:sp>
+        <p:nvSpPr>
+          <p:cNvPr id="46" name="TextBox 45"/>
+          <p:cNvSpPr txBox="1"/>
+          <p:nvPr/>
+        </p:nvSpPr>
+        <p:spPr>
+          <a:xfrm>
+            <a:off x="5760454" y="4009694"/>
+            <a:ext cx="942887" cy="215444"/>
+          </a:xfrm>
+          <a:prstGeom prst="rect">
+            <a:avLst/>
+          </a:prstGeom>
+          <a:noFill/>
+        </p:spPr>
+        <p:txBody>
+          <a:bodyPr wrap="none" rtlCol="0">
+            <a:spAutoFit/>
+          </a:bodyPr>
+          <a:lstStyle/>
+          <a:p>
+            <a:r>
+              <a:rPr lang="en-US" sz="800" dirty="0" smtClean="0"/>
+              <a:t>Data requested</a:t>
+            </a:r>
+            <a:endParaRPr lang="en-GB" sz="800" dirty="0"/>
+          </a:p>
+        </p:txBody>
+      </p:sp>
+      <p:sp>
+        <p:nvSpPr>
+          <p:cNvPr id="47" name="TextBox 46"/>
+          <p:cNvSpPr txBox="1"/>
+          <p:nvPr/>
+        </p:nvSpPr>
+        <p:spPr>
+          <a:xfrm>
+            <a:off x="2933411" y="4009694"/>
+            <a:ext cx="673582" cy="215444"/>
+          </a:xfrm>
+          <a:prstGeom prst="rect">
+            <a:avLst/>
+          </a:prstGeom>
+          <a:noFill/>
+        </p:spPr>
+        <p:txBody>
+          <a:bodyPr wrap="none" rtlCol="0">
+            <a:spAutoFit/>
+          </a:bodyPr>
+          <a:lstStyle/>
+          <a:p>
+            <a:r>
+              <a:rPr lang="en-US" sz="800" dirty="0" smtClean="0"/>
+              <a:t>JSON data</a:t>
+            </a:r>
+            <a:endParaRPr lang="en-GB" sz="800" dirty="0"/>
+          </a:p>
+        </p:txBody>
+      </p:sp>
+      <p:sp>
+        <p:nvSpPr>
+          <p:cNvPr id="48" name="TextBox 47"/>
+          <p:cNvSpPr txBox="1"/>
+          <p:nvPr/>
+        </p:nvSpPr>
+        <p:spPr>
+          <a:xfrm>
+            <a:off x="195845" y="4009694"/>
+            <a:ext cx="673582" cy="215444"/>
+          </a:xfrm>
+          <a:prstGeom prst="rect">
+            <a:avLst/>
+          </a:prstGeom>
+          <a:noFill/>
+        </p:spPr>
+        <p:txBody>
+          <a:bodyPr wrap="none" rtlCol="0">
+            <a:spAutoFit/>
+          </a:bodyPr>
+          <a:lstStyle/>
+          <a:p>
+            <a:r>
+              <a:rPr lang="en-US" sz="800" dirty="0" smtClean="0"/>
+              <a:t>JSON data</a:t>
+            </a:r>
+            <a:endParaRPr lang="en-GB" sz="800" dirty="0"/>
+          </a:p>
+        </p:txBody>
+      </p:sp>
+    </p:spTree>
+    <p:extLst>
+      <p:ext uri="{BB962C8B-B14F-4D97-AF65-F5344CB8AC3E}">
+        <p14:creationId xmlns:p14="http://schemas.microsoft.com/office/powerpoint/2010/main" val="588671105"/>
       </p:ext>
     </p:extLst>
   </p:cSld>

</xml_diff>